<commit_message>
[OP] Actualización de los documentos, planes, estados, riesgos
</commit_message>
<xml_diff>
--- a/Iteración II/Presentacion semana VIII 17 de Octubre.pptx
+++ b/Iteración II/Presentacion semana VIII 17 de Octubre.pptx
@@ -301,7 +301,7 @@
             <a:fld id="{B61BEF0D-F0BB-DE4B-95CE-6DB70DBA9567}" type="datetimeFigureOut">
               <a:rPr lang="en-US" dirty="0"/>
               <a:pPr/>
-              <a:t>10/16/2013</a:t>
+              <a:t>10/17/2013</a:t>
             </a:fld>
             <a:endParaRPr lang="en-US" dirty="0"/>
           </a:p>
@@ -636,7 +636,7 @@
             <a:fld id="{B61BEF0D-F0BB-DE4B-95CE-6DB70DBA9567}" type="datetimeFigureOut">
               <a:rPr lang="en-US" dirty="0"/>
               <a:pPr/>
-              <a:t>10/16/2013</a:t>
+              <a:t>10/17/2013</a:t>
             </a:fld>
             <a:endParaRPr lang="en-US" dirty="0"/>
           </a:p>
@@ -1034,7 +1034,7 @@
             <a:fld id="{B61BEF0D-F0BB-DE4B-95CE-6DB70DBA9567}" type="datetimeFigureOut">
               <a:rPr lang="en-US" dirty="0"/>
               <a:pPr/>
-              <a:t>10/16/2013</a:t>
+              <a:t>10/17/2013</a:t>
             </a:fld>
             <a:endParaRPr lang="en-US" dirty="0"/>
           </a:p>
@@ -1367,7 +1367,7 @@
             <a:fld id="{B61BEF0D-F0BB-DE4B-95CE-6DB70DBA9567}" type="datetimeFigureOut">
               <a:rPr lang="en-US" dirty="0"/>
               <a:pPr/>
-              <a:t>10/16/2013</a:t>
+              <a:t>10/17/2013</a:t>
             </a:fld>
             <a:endParaRPr lang="en-US" dirty="0"/>
           </a:p>
@@ -1684,7 +1684,7 @@
             <a:fld id="{B61BEF0D-F0BB-DE4B-95CE-6DB70DBA9567}" type="datetimeFigureOut">
               <a:rPr lang="en-US" dirty="0"/>
               <a:pPr/>
-              <a:t>10/16/2013</a:t>
+              <a:t>10/17/2013</a:t>
             </a:fld>
             <a:endParaRPr lang="en-US" dirty="0"/>
           </a:p>
@@ -2077,7 +2077,7 @@
             <a:fld id="{B61BEF0D-F0BB-DE4B-95CE-6DB70DBA9567}" type="datetimeFigureOut">
               <a:rPr lang="en-US" dirty="0"/>
               <a:pPr/>
-              <a:t>10/16/2013</a:t>
+              <a:t>10/17/2013</a:t>
             </a:fld>
             <a:endParaRPr lang="en-US" dirty="0"/>
           </a:p>
@@ -2331,7 +2331,7 @@
             <a:fld id="{B61BEF0D-F0BB-DE4B-95CE-6DB70DBA9567}" type="datetimeFigureOut">
               <a:rPr lang="en-US" dirty="0"/>
               <a:pPr/>
-              <a:t>10/16/2013</a:t>
+              <a:t>10/17/2013</a:t>
             </a:fld>
             <a:endParaRPr lang="en-US" dirty="0"/>
           </a:p>
@@ -2590,7 +2590,7 @@
             <a:fld id="{B61BEF0D-F0BB-DE4B-95CE-6DB70DBA9567}" type="datetimeFigureOut">
               <a:rPr lang="en-US" dirty="0"/>
               <a:pPr/>
-              <a:t>10/16/2013</a:t>
+              <a:t>10/17/2013</a:t>
             </a:fld>
             <a:endParaRPr lang="en-US" dirty="0"/>
           </a:p>
@@ -2849,7 +2849,7 @@
             <a:fld id="{B61BEF0D-F0BB-DE4B-95CE-6DB70DBA9567}" type="datetimeFigureOut">
               <a:rPr lang="en-US" dirty="0"/>
               <a:pPr/>
-              <a:t>10/16/2013</a:t>
+              <a:t>10/17/2013</a:t>
             </a:fld>
             <a:endParaRPr lang="en-US" dirty="0"/>
           </a:p>
@@ -3175,7 +3175,7 @@
             <a:fld id="{B61BEF0D-F0BB-DE4B-95CE-6DB70DBA9567}" type="datetimeFigureOut">
               <a:rPr lang="en-US" dirty="0"/>
               <a:pPr/>
-              <a:t>10/16/2013</a:t>
+              <a:t>10/17/2013</a:t>
             </a:fld>
             <a:endParaRPr lang="en-US" dirty="0"/>
           </a:p>
@@ -3495,7 +3495,7 @@
             <a:fld id="{B61BEF0D-F0BB-DE4B-95CE-6DB70DBA9567}" type="datetimeFigureOut">
               <a:rPr lang="en-US" dirty="0"/>
               <a:pPr/>
-              <a:t>10/16/2013</a:t>
+              <a:t>10/17/2013</a:t>
             </a:fld>
             <a:endParaRPr lang="en-US" dirty="0"/>
           </a:p>
@@ -3949,7 +3949,7 @@
             <a:fld id="{B61BEF0D-F0BB-DE4B-95CE-6DB70DBA9567}" type="datetimeFigureOut">
               <a:rPr lang="en-US" dirty="0"/>
               <a:pPr/>
-              <a:t>10/16/2013</a:t>
+              <a:t>10/17/2013</a:t>
             </a:fld>
             <a:endParaRPr lang="en-US" dirty="0"/>
           </a:p>
@@ -4151,7 +4151,7 @@
             <a:fld id="{B61BEF0D-F0BB-DE4B-95CE-6DB70DBA9567}" type="datetimeFigureOut">
               <a:rPr lang="en-US" dirty="0"/>
               <a:pPr/>
-              <a:t>10/16/2013</a:t>
+              <a:t>10/17/2013</a:t>
             </a:fld>
             <a:endParaRPr lang="en-US" dirty="0"/>
           </a:p>
@@ -4325,7 +4325,7 @@
             <a:fld id="{B61BEF0D-F0BB-DE4B-95CE-6DB70DBA9567}" type="datetimeFigureOut">
               <a:rPr lang="en-US" dirty="0"/>
               <a:pPr/>
-              <a:t>10/16/2013</a:t>
+              <a:t>10/17/2013</a:t>
             </a:fld>
             <a:endParaRPr lang="en-US" dirty="0"/>
           </a:p>
@@ -4655,7 +4655,7 @@
             <a:fld id="{B61BEF0D-F0BB-DE4B-95CE-6DB70DBA9567}" type="datetimeFigureOut">
               <a:rPr lang="en-US" dirty="0"/>
               <a:pPr/>
-              <a:t>10/16/2013</a:t>
+              <a:t>10/17/2013</a:t>
             </a:fld>
             <a:endParaRPr lang="en-US" dirty="0"/>
           </a:p>
@@ -4997,7 +4997,7 @@
             <a:fld id="{B61BEF0D-F0BB-DE4B-95CE-6DB70DBA9567}" type="datetimeFigureOut">
               <a:rPr lang="en-US" dirty="0"/>
               <a:pPr/>
-              <a:t>10/16/2013</a:t>
+              <a:t>10/17/2013</a:t>
             </a:fld>
             <a:endParaRPr lang="en-US" dirty="0"/>
           </a:p>
@@ -7111,7 +7111,7 @@
             <a:fld id="{B61BEF0D-F0BB-DE4B-95CE-6DB70DBA9567}" type="datetimeFigureOut">
               <a:rPr lang="en-US" dirty="0"/>
               <a:pPr/>
-              <a:t>10/16/2013</a:t>
+              <a:t>10/17/2013</a:t>
             </a:fld>
             <a:endParaRPr lang="en-US" dirty="0"/>
           </a:p>
@@ -7792,16 +7792,7 @@
                             <a:schemeClr val="tx1"/>
                           </a:solidFill>
                         </a:rPr>
-                        <a:t>Omar Pizarro: </a:t>
-                      </a:r>
-                      <a:r>
-                        <a:rPr lang="es-CL" sz="1600" b="0" dirty="0" smtClean="0">
-                          <a:ln/>
-                          <a:solidFill>
-                            <a:schemeClr val="tx1"/>
-                          </a:solidFill>
-                        </a:rPr>
-                        <a:t>10:13</a:t>
+                        <a:t>Omar Pizarro: 10:13</a:t>
                       </a:r>
                       <a:endParaRPr lang="es-CL" sz="1600" b="0" baseline="0" dirty="0" smtClean="0">
                         <a:ln/>
@@ -7819,16 +7810,7 @@
                             <a:schemeClr val="tx1"/>
                           </a:solidFill>
                         </a:rPr>
-                        <a:t>Juan Carlos Garcés: </a:t>
-                      </a:r>
-                      <a:r>
-                        <a:rPr lang="es-CL" sz="1600" b="0" dirty="0" smtClean="0">
-                          <a:ln/>
-                          <a:solidFill>
-                            <a:schemeClr val="tx1"/>
-                          </a:solidFill>
-                        </a:rPr>
-                        <a:t>10:13</a:t>
+                        <a:t>Juan Carlos Garcés: 10:13</a:t>
                       </a:r>
                       <a:endParaRPr lang="es-CL" dirty="0"/>
                     </a:p>
@@ -8362,25 +8344,8 @@
                           <a:effectLst/>
                           <a:latin typeface="Calibri" panose="020F0502020204030204" pitchFamily="34" charset="0"/>
                         </a:rPr>
-                        <a:t> </a:t>
+                        <a:t> Migración de Servidores</a:t>
                       </a:r>
-                      <a:r>
-                        <a:rPr lang="es-CL" sz="1200" dirty="0" smtClean="0">
-                          <a:solidFill>
-                            <a:srgbClr val="000000"/>
-                          </a:solidFill>
-                          <a:effectLst/>
-                          <a:latin typeface="Calibri" panose="020F0502020204030204" pitchFamily="34" charset="0"/>
-                        </a:rPr>
-                        <a:t>Migración de Servidores</a:t>
-                      </a:r>
-                      <a:endParaRPr lang="es-CL" sz="1200" dirty="0" smtClean="0">
-                        <a:solidFill>
-                          <a:srgbClr val="000000"/>
-                        </a:solidFill>
-                        <a:effectLst/>
-                        <a:latin typeface="Calibri" panose="020F0502020204030204" pitchFamily="34" charset="0"/>
-                      </a:endParaRPr>
                     </a:p>
                   </a:txBody>
                   <a:tcPr marL="9525" marR="9525" marT="9525" marB="9525" anchor="ctr">
@@ -8648,15 +8613,7 @@
                   <a:srgbClr val="FF0000"/>
                 </a:solidFill>
               </a:rPr>
-              <a:t>72</a:t>
-            </a:r>
-            <a:r>
-              <a:rPr lang="es-CL" dirty="0" smtClean="0">
-                <a:solidFill>
-                  <a:srgbClr val="FF0000"/>
-                </a:solidFill>
-              </a:rPr>
-              <a:t>,6%</a:t>
+              <a:t>72,6%</a:t>
             </a:r>
             <a:endParaRPr lang="es-CL" dirty="0">
               <a:solidFill>
@@ -10217,13 +10174,6 @@
                         </a:rPr>
                         <a:t>20:26</a:t>
                       </a:r>
-                      <a:endParaRPr lang="es-CL" sz="1200" dirty="0" smtClean="0">
-                        <a:solidFill>
-                          <a:srgbClr val="000000"/>
-                        </a:solidFill>
-                        <a:effectLst/>
-                        <a:latin typeface="Calibri" panose="020F0502020204030204" pitchFamily="34" charset="0"/>
-                      </a:endParaRPr>
                     </a:p>
                   </a:txBody>
                   <a:tcPr marL="9525" marR="9525" marT="9525" marB="9525" anchor="ctr">
@@ -10346,7 +10296,7 @@
         <p:spPr>
           <a:xfrm>
             <a:off x="789559" y="3594186"/>
-            <a:ext cx="1993900" cy="307777"/>
+            <a:ext cx="2504786" cy="307777"/>
           </a:xfrm>
           <a:prstGeom prst="rect">
             <a:avLst/>
@@ -10365,7 +10315,7 @@
                   <a:srgbClr val="92D050"/>
                 </a:solidFill>
               </a:rPr>
-              <a:t>Total: </a:t>
+              <a:t>Total: $</a:t>
             </a:r>
             <a:r>
               <a:rPr lang="es-CL" sz="1400" b="1" dirty="0" smtClean="0">
@@ -10373,7 +10323,7 @@
                   <a:srgbClr val="92D050"/>
                 </a:solidFill>
               </a:rPr>
-              <a:t>$103.446.-</a:t>
+              <a:t>103.446 + $30.000.-</a:t>
             </a:r>
             <a:endParaRPr lang="es-CL" sz="1400" b="1" dirty="0">
               <a:solidFill>
@@ -10392,7 +10342,7 @@
           <p:nvPr>
             <p:extLst>
               <p:ext uri="{D42A27DB-BD31-4B8C-83A1-F6EECF244321}">
-                <p14:modId xmlns:p14="http://schemas.microsoft.com/office/powerpoint/2010/main" val="240840695"/>
+                <p14:modId xmlns:p14="http://schemas.microsoft.com/office/powerpoint/2010/main" val="3777049112"/>
               </p:ext>
             </p:extLst>
           </p:nvPr>
@@ -10564,7 +10514,7 @@
                           </a:solidFill>
                           <a:effectLst/>
                         </a:rPr>
-                        <a:t>32,3</a:t>
+                        <a:t>32,8</a:t>
                       </a:r>
                       <a:r>
                         <a:rPr lang="es-CL" sz="1200" b="1" cap="none" spc="0" baseline="0" dirty="0" smtClean="0">
@@ -10667,7 +10617,7 @@
                           </a:solidFill>
                           <a:effectLst/>
                         </a:rPr>
-                        <a:t>67,7%</a:t>
+                        <a:t>67,2%</a:t>
                       </a:r>
                       <a:endParaRPr lang="es-CL" sz="1200" b="1" cap="none" spc="0" dirty="0" smtClean="0">
                         <a:ln/>

</xml_diff>